<commit_message>
irrelevant changes to figures
</commit_message>
<xml_diff>
--- a/Analysis/ICIRs_All_Geometries.pptx
+++ b/Analysis/ICIRs_All_Geometries.pptx
@@ -3813,10 +3813,10 @@
       </p:pic>
       <p:pic>
         <p:nvPicPr>
-          <p:cNvPr id="31" name="Imagen 30">
-            <a:extLst>
-              <a:ext uri="{FF2B5EF4-FFF2-40B4-BE49-F238E27FC236}">
-                <a16:creationId xmlns:a16="http://schemas.microsoft.com/office/drawing/2014/main" id="{C096FE18-9ADB-E843-9ED8-ABBAA73ABD38}"/>
+          <p:cNvPr id="33" name="Imagen 32">
+            <a:extLst>
+              <a:ext uri="{FF2B5EF4-FFF2-40B4-BE49-F238E27FC236}">
+                <a16:creationId xmlns:a16="http://schemas.microsoft.com/office/drawing/2014/main" id="{FF0327B7-BE80-6F46-A867-17BBF6CBCDBF}"/>
               </a:ext>
             </a:extLst>
           </p:cNvPr>
@@ -3827,36 +3827,6 @@
         </p:nvPicPr>
         <p:blipFill>
           <a:blip r:embed="rId9"/>
-          <a:stretch>
-            <a:fillRect/>
-          </a:stretch>
-        </p:blipFill>
-        <p:spPr>
-          <a:xfrm>
-            <a:off x="8627435" y="2125817"/>
-            <a:ext cx="2486578" cy="1864934"/>
-          </a:xfrm>
-          <a:prstGeom prst="rect">
-            <a:avLst/>
-          </a:prstGeom>
-        </p:spPr>
-      </p:pic>
-      <p:pic>
-        <p:nvPicPr>
-          <p:cNvPr id="33" name="Imagen 32">
-            <a:extLst>
-              <a:ext uri="{FF2B5EF4-FFF2-40B4-BE49-F238E27FC236}">
-                <a16:creationId xmlns:a16="http://schemas.microsoft.com/office/drawing/2014/main" id="{FF0327B7-BE80-6F46-A867-17BBF6CBCDBF}"/>
-              </a:ext>
-            </a:extLst>
-          </p:cNvPr>
-          <p:cNvPicPr>
-            <a:picLocks noChangeAspect="1"/>
-          </p:cNvPicPr>
-          <p:nvPr/>
-        </p:nvPicPr>
-        <p:blipFill>
-          <a:blip r:embed="rId10"/>
           <a:stretch>
             <a:fillRect/>
           </a:stretch>
@@ -3886,7 +3856,7 @@
           <p:nvPr/>
         </p:nvPicPr>
         <p:blipFill>
-          <a:blip r:embed="rId11"/>
+          <a:blip r:embed="rId10"/>
           <a:stretch>
             <a:fillRect/>
           </a:stretch>
@@ -3916,7 +3886,7 @@
           <p:nvPr/>
         </p:nvPicPr>
         <p:blipFill>
-          <a:blip r:embed="rId12"/>
+          <a:blip r:embed="rId11"/>
           <a:stretch>
             <a:fillRect/>
           </a:stretch>
@@ -3946,7 +3916,7 @@
           <p:nvPr/>
         </p:nvPicPr>
         <p:blipFill>
-          <a:blip r:embed="rId13"/>
+          <a:blip r:embed="rId12"/>
           <a:stretch>
             <a:fillRect/>
           </a:stretch>
@@ -3955,6 +3925,36 @@
           <a:xfrm>
             <a:off x="3753768" y="4459502"/>
             <a:ext cx="2300496" cy="1725372"/>
+          </a:xfrm>
+          <a:prstGeom prst="rect">
+            <a:avLst/>
+          </a:prstGeom>
+        </p:spPr>
+      </p:pic>
+      <p:pic>
+        <p:nvPicPr>
+          <p:cNvPr id="8" name="Imagen 7">
+            <a:extLst>
+              <a:ext uri="{FF2B5EF4-FFF2-40B4-BE49-F238E27FC236}">
+                <a16:creationId xmlns:a16="http://schemas.microsoft.com/office/drawing/2014/main" id="{6D53C1A6-73CF-8C4E-BA0F-5A6829C782EC}"/>
+              </a:ext>
+            </a:extLst>
+          </p:cNvPr>
+          <p:cNvPicPr>
+            <a:picLocks noChangeAspect="1"/>
+          </p:cNvPicPr>
+          <p:nvPr/>
+        </p:nvPicPr>
+        <p:blipFill>
+          <a:blip r:embed="rId13"/>
+          <a:stretch>
+            <a:fillRect/>
+          </a:stretch>
+        </p:blipFill>
+        <p:spPr>
+          <a:xfrm>
+            <a:off x="8532834" y="2124583"/>
+            <a:ext cx="2535723" cy="1901793"/>
           </a:xfrm>
           <a:prstGeom prst="rect">
             <a:avLst/>

</xml_diff>

<commit_message>
ICIRs of 020 in 3D-2D
</commit_message>
<xml_diff>
--- a/Analysis/ICIRs_All_Geometries.pptx
+++ b/Analysis/ICIRs_All_Geometries.pptx
@@ -261,7 +261,7 @@
           <a:p>
             <a:fld id="{8486204C-5B5D-854D-B807-BE3EB0761195}" type="datetimeFigureOut">
               <a:rPr lang="en-GB" smtClean="0"/>
-              <a:t>17/01/2022</a:t>
+              <a:t>20/01/2022</a:t>
             </a:fld>
             <a:endParaRPr lang="en-GB"/>
           </a:p>
@@ -461,7 +461,7 @@
           <a:p>
             <a:fld id="{8486204C-5B5D-854D-B807-BE3EB0761195}" type="datetimeFigureOut">
               <a:rPr lang="en-GB" smtClean="0"/>
-              <a:t>17/01/2022</a:t>
+              <a:t>20/01/2022</a:t>
             </a:fld>
             <a:endParaRPr lang="en-GB"/>
           </a:p>
@@ -671,7 +671,7 @@
           <a:p>
             <a:fld id="{8486204C-5B5D-854D-B807-BE3EB0761195}" type="datetimeFigureOut">
               <a:rPr lang="en-GB" smtClean="0"/>
-              <a:t>17/01/2022</a:t>
+              <a:t>20/01/2022</a:t>
             </a:fld>
             <a:endParaRPr lang="en-GB"/>
           </a:p>
@@ -871,7 +871,7 @@
           <a:p>
             <a:fld id="{8486204C-5B5D-854D-B807-BE3EB0761195}" type="datetimeFigureOut">
               <a:rPr lang="en-GB" smtClean="0"/>
-              <a:t>17/01/2022</a:t>
+              <a:t>20/01/2022</a:t>
             </a:fld>
             <a:endParaRPr lang="en-GB"/>
           </a:p>
@@ -1147,7 +1147,7 @@
           <a:p>
             <a:fld id="{8486204C-5B5D-854D-B807-BE3EB0761195}" type="datetimeFigureOut">
               <a:rPr lang="en-GB" smtClean="0"/>
-              <a:t>17/01/2022</a:t>
+              <a:t>20/01/2022</a:t>
             </a:fld>
             <a:endParaRPr lang="en-GB"/>
           </a:p>
@@ -1415,7 +1415,7 @@
           <a:p>
             <a:fld id="{8486204C-5B5D-854D-B807-BE3EB0761195}" type="datetimeFigureOut">
               <a:rPr lang="en-GB" smtClean="0"/>
-              <a:t>17/01/2022</a:t>
+              <a:t>20/01/2022</a:t>
             </a:fld>
             <a:endParaRPr lang="en-GB"/>
           </a:p>
@@ -1830,7 +1830,7 @@
           <a:p>
             <a:fld id="{8486204C-5B5D-854D-B807-BE3EB0761195}" type="datetimeFigureOut">
               <a:rPr lang="en-GB" smtClean="0"/>
-              <a:t>17/01/2022</a:t>
+              <a:t>20/01/2022</a:t>
             </a:fld>
             <a:endParaRPr lang="en-GB"/>
           </a:p>
@@ -1972,7 +1972,7 @@
           <a:p>
             <a:fld id="{8486204C-5B5D-854D-B807-BE3EB0761195}" type="datetimeFigureOut">
               <a:rPr lang="en-GB" smtClean="0"/>
-              <a:t>17/01/2022</a:t>
+              <a:t>20/01/2022</a:t>
             </a:fld>
             <a:endParaRPr lang="en-GB"/>
           </a:p>
@@ -2085,7 +2085,7 @@
           <a:p>
             <a:fld id="{8486204C-5B5D-854D-B807-BE3EB0761195}" type="datetimeFigureOut">
               <a:rPr lang="en-GB" smtClean="0"/>
-              <a:t>17/01/2022</a:t>
+              <a:t>20/01/2022</a:t>
             </a:fld>
             <a:endParaRPr lang="en-GB"/>
           </a:p>
@@ -2398,7 +2398,7 @@
           <a:p>
             <a:fld id="{8486204C-5B5D-854D-B807-BE3EB0761195}" type="datetimeFigureOut">
               <a:rPr lang="en-GB" smtClean="0"/>
-              <a:t>17/01/2022</a:t>
+              <a:t>20/01/2022</a:t>
             </a:fld>
             <a:endParaRPr lang="en-GB"/>
           </a:p>
@@ -2687,7 +2687,7 @@
           <a:p>
             <a:fld id="{8486204C-5B5D-854D-B807-BE3EB0761195}" type="datetimeFigureOut">
               <a:rPr lang="en-GB" smtClean="0"/>
-              <a:t>17/01/2022</a:t>
+              <a:t>20/01/2022</a:t>
             </a:fld>
             <a:endParaRPr lang="en-GB"/>
           </a:p>
@@ -2930,7 +2930,7 @@
           <a:p>
             <a:fld id="{8486204C-5B5D-854D-B807-BE3EB0761195}" type="datetimeFigureOut">
               <a:rPr lang="en-GB" smtClean="0"/>
-              <a:t>17/01/2022</a:t>
+              <a:t>20/01/2022</a:t>
             </a:fld>
             <a:endParaRPr lang="en-GB"/>
           </a:p>
@@ -3903,10 +3903,10 @@
       </p:pic>
       <p:pic>
         <p:nvPicPr>
-          <p:cNvPr id="4" name="Imagen 3">
-            <a:extLst>
-              <a:ext uri="{FF2B5EF4-FFF2-40B4-BE49-F238E27FC236}">
-                <a16:creationId xmlns:a16="http://schemas.microsoft.com/office/drawing/2014/main" id="{2A65B8C4-CE10-9A48-8C2E-211EA6A6133B}"/>
+          <p:cNvPr id="9" name="Imagen 8">
+            <a:extLst>
+              <a:ext uri="{FF2B5EF4-FFF2-40B4-BE49-F238E27FC236}">
+                <a16:creationId xmlns:a16="http://schemas.microsoft.com/office/drawing/2014/main" id="{1167AB5F-6382-2147-AD88-092E62B52DA5}"/>
               </a:ext>
             </a:extLst>
           </p:cNvPr>
@@ -3923,8 +3923,8 @@
         </p:blipFill>
         <p:spPr>
           <a:xfrm>
-            <a:off x="3753768" y="2301003"/>
-            <a:ext cx="2300496" cy="1725372"/>
+            <a:off x="3753767" y="4459500"/>
+            <a:ext cx="2300497" cy="1725373"/>
           </a:xfrm>
           <a:prstGeom prst="rect">
             <a:avLst/>
@@ -3933,10 +3933,10 @@
       </p:pic>
       <p:pic>
         <p:nvPicPr>
-          <p:cNvPr id="9" name="Imagen 8">
-            <a:extLst>
-              <a:ext uri="{FF2B5EF4-FFF2-40B4-BE49-F238E27FC236}">
-                <a16:creationId xmlns:a16="http://schemas.microsoft.com/office/drawing/2014/main" id="{1167AB5F-6382-2147-AD88-092E62B52DA5}"/>
+          <p:cNvPr id="3" name="Imagen 2">
+            <a:extLst>
+              <a:ext uri="{FF2B5EF4-FFF2-40B4-BE49-F238E27FC236}">
+                <a16:creationId xmlns:a16="http://schemas.microsoft.com/office/drawing/2014/main" id="{518CA626-7AC7-2845-93DD-0B81E14F5710}"/>
               </a:ext>
             </a:extLst>
           </p:cNvPr>
@@ -3953,8 +3953,8 @@
         </p:blipFill>
         <p:spPr>
           <a:xfrm>
-            <a:off x="3753767" y="4459500"/>
-            <a:ext cx="2300497" cy="1725373"/>
+            <a:off x="3753768" y="2301003"/>
+            <a:ext cx="2300496" cy="1725372"/>
           </a:xfrm>
           <a:prstGeom prst="rect">
             <a:avLst/>

</xml_diff>